<commit_message>
Dodano przykład z narzędzia online
</commit_message>
<xml_diff>
--- a/Grafika/Przestrzenie Kolorów.pptx
+++ b/Grafika/Przestrzenie Kolorów.pptx
@@ -5,7 +5,7 @@
     <p:sldMasterId id="2147483661" r:id="rId1"/>
   </p:sldMasterIdLst>
   <p:notesMasterIdLst>
-    <p:notesMasterId r:id="rId9"/>
+    <p:notesMasterId r:id="rId10"/>
   </p:notesMasterIdLst>
   <p:sldIdLst>
     <p:sldId id="256" r:id="rId2"/>
@@ -14,7 +14,8 @@
     <p:sldId id="262" r:id="rId5"/>
     <p:sldId id="263" r:id="rId6"/>
     <p:sldId id="264" r:id="rId7"/>
-    <p:sldId id="259" r:id="rId8"/>
+    <p:sldId id="265" r:id="rId8"/>
+    <p:sldId id="259" r:id="rId9"/>
   </p:sldIdLst>
   <p:sldSz cx="13004800" cy="9753600"/>
   <p:notesSz cx="6858000" cy="9144000"/>
@@ -654,7 +655,7 @@
           <a:p>
             <a:fld id="{C3B3FCEF-2765-2145-8DFD-713D627F0236}" type="datetimeFigureOut">
               <a:rPr lang="pl-PL" smtClean="0"/>
-              <a:t>29.08.2018</a:t>
+              <a:t>07.09.2018</a:t>
             </a:fld>
             <a:endParaRPr lang="pl-PL"/>
           </a:p>
@@ -827,7 +828,7 @@
           <a:p>
             <a:fld id="{C3B3FCEF-2765-2145-8DFD-713D627F0236}" type="datetimeFigureOut">
               <a:rPr lang="pl-PL" smtClean="0"/>
-              <a:t>29.08.2018</a:t>
+              <a:t>07.09.2018</a:t>
             </a:fld>
             <a:endParaRPr lang="pl-PL"/>
           </a:p>
@@ -1010,7 +1011,7 @@
           <a:p>
             <a:fld id="{C3B3FCEF-2765-2145-8DFD-713D627F0236}" type="datetimeFigureOut">
               <a:rPr lang="pl-PL" smtClean="0"/>
-              <a:t>29.08.2018</a:t>
+              <a:t>07.09.2018</a:t>
             </a:fld>
             <a:endParaRPr lang="pl-PL"/>
           </a:p>
@@ -1183,7 +1184,7 @@
           <a:p>
             <a:fld id="{C3B3FCEF-2765-2145-8DFD-713D627F0236}" type="datetimeFigureOut">
               <a:rPr lang="pl-PL" smtClean="0"/>
-              <a:t>29.08.2018</a:t>
+              <a:t>07.09.2018</a:t>
             </a:fld>
             <a:endParaRPr lang="pl-PL"/>
           </a:p>
@@ -1461,7 +1462,7 @@
           <a:p>
             <a:fld id="{C3B3FCEF-2765-2145-8DFD-713D627F0236}" type="datetimeFigureOut">
               <a:rPr lang="pl-PL" smtClean="0"/>
-              <a:t>29.08.2018</a:t>
+              <a:t>07.09.2018</a:t>
             </a:fld>
             <a:endParaRPr lang="pl-PL"/>
           </a:p>
@@ -1676,7 +1677,7 @@
           <a:p>
             <a:fld id="{C3B3FCEF-2765-2145-8DFD-713D627F0236}" type="datetimeFigureOut">
               <a:rPr lang="pl-PL" smtClean="0"/>
-              <a:t>29.08.2018</a:t>
+              <a:t>07.09.2018</a:t>
             </a:fld>
             <a:endParaRPr lang="pl-PL"/>
           </a:p>
@@ -2044,7 +2045,7 @@
           <a:p>
             <a:fld id="{C3B3FCEF-2765-2145-8DFD-713D627F0236}" type="datetimeFigureOut">
               <a:rPr lang="pl-PL" smtClean="0"/>
-              <a:t>29.08.2018</a:t>
+              <a:t>07.09.2018</a:t>
             </a:fld>
             <a:endParaRPr lang="pl-PL"/>
           </a:p>
@@ -2185,7 +2186,7 @@
           <a:p>
             <a:fld id="{C3B3FCEF-2765-2145-8DFD-713D627F0236}" type="datetimeFigureOut">
               <a:rPr lang="pl-PL" smtClean="0"/>
-              <a:t>29.08.2018</a:t>
+              <a:t>07.09.2018</a:t>
             </a:fld>
             <a:endParaRPr lang="pl-PL"/>
           </a:p>
@@ -2298,7 +2299,7 @@
           <a:p>
             <a:fld id="{C3B3FCEF-2765-2145-8DFD-713D627F0236}" type="datetimeFigureOut">
               <a:rPr lang="pl-PL" smtClean="0"/>
-              <a:t>29.08.2018</a:t>
+              <a:t>07.09.2018</a:t>
             </a:fld>
             <a:endParaRPr lang="pl-PL"/>
           </a:p>
@@ -2587,7 +2588,7 @@
           <a:p>
             <a:fld id="{C3B3FCEF-2765-2145-8DFD-713D627F0236}" type="datetimeFigureOut">
               <a:rPr lang="pl-PL" smtClean="0"/>
-              <a:t>29.08.2018</a:t>
+              <a:t>07.09.2018</a:t>
             </a:fld>
             <a:endParaRPr lang="pl-PL"/>
           </a:p>
@@ -2878,7 +2879,7 @@
           <a:p>
             <a:fld id="{C3B3FCEF-2765-2145-8DFD-713D627F0236}" type="datetimeFigureOut">
               <a:rPr lang="pl-PL" smtClean="0"/>
-              <a:t>29.08.2018</a:t>
+              <a:t>07.09.2018</a:t>
             </a:fld>
             <a:endParaRPr lang="pl-PL"/>
           </a:p>
@@ -3094,7 +3095,7 @@
           <a:p>
             <a:fld id="{C3B3FCEF-2765-2145-8DFD-713D627F0236}" type="datetimeFigureOut">
               <a:rPr lang="pl-PL" smtClean="0"/>
-              <a:t>29.08.2018</a:t>
+              <a:t>07.09.2018</a:t>
             </a:fld>
             <a:endParaRPr lang="pl-PL"/>
           </a:p>
@@ -7191,6 +7192,188 @@
 <file path=ppt/slides/slide7.xml><?xml version="1.0" encoding="utf-8"?>
 <p:sld xmlns:a="http://schemas.openxmlformats.org/drawingml/2006/main" xmlns:r="http://schemas.openxmlformats.org/officeDocument/2006/relationships" xmlns:p="http://schemas.openxmlformats.org/presentationml/2006/main">
   <p:cSld>
+    <p:bg>
+      <p:bgPr>
+        <a:solidFill>
+          <a:schemeClr val="bg1"/>
+        </a:solidFill>
+        <a:effectLst/>
+      </p:bgPr>
+    </p:bg>
+    <p:spTree>
+      <p:nvGrpSpPr>
+        <p:cNvPr id="1" name=""/>
+        <p:cNvGrpSpPr/>
+        <p:nvPr/>
+      </p:nvGrpSpPr>
+      <p:grpSpPr>
+        <a:xfrm>
+          <a:off x="0" y="0"/>
+          <a:ext cx="0" cy="0"/>
+          <a:chOff x="0" y="0"/>
+          <a:chExt cx="0" cy="0"/>
+        </a:xfrm>
+      </p:grpSpPr>
+      <p:sp>
+        <p:nvSpPr>
+          <p:cNvPr id="10" name="Rectangle 9">
+            <a:extLst>
+              <a:ext uri="{FF2B5EF4-FFF2-40B4-BE49-F238E27FC236}">
+                <a16:creationId xmlns:a16="http://schemas.microsoft.com/office/drawing/2014/main" id="{A4AC5506-6312-4701-8D3C-40187889A947}"/>
+              </a:ext>
+              <a:ext uri="{C183D7F6-B498-43B3-948B-1728B52AA6E4}">
+                <adec:decorative xmlns:adec="http://schemas.microsoft.com/office/drawing/2017/decorative" val="1"/>
+              </a:ext>
+            </a:extLst>
+          </p:cNvPr>
+          <p:cNvSpPr>
+            <a:spLocks noGrp="1" noRot="1" noChangeAspect="1" noMove="1" noResize="1" noEditPoints="1" noAdjustHandles="1" noChangeArrowheads="1" noChangeShapeType="1" noTextEdit="1"/>
+          </p:cNvSpPr>
+          <p:nvPr>
+            <p:extLst>
+              <p:ext uri="{386F3935-93C4-4BCD-93E2-E3B085C9AB24}">
+                <p16:designElem xmlns:p16="http://schemas.microsoft.com/office/powerpoint/2015/main" val="1"/>
+              </p:ext>
+            </p:extLst>
+          </p:nvPr>
+        </p:nvSpPr>
+        <p:spPr>
+          <a:xfrm>
+            <a:off x="0" y="926936"/>
+            <a:ext cx="13004800" cy="1047539"/>
+          </a:xfrm>
+          <a:prstGeom prst="rect">
+            <a:avLst/>
+          </a:prstGeom>
+          <a:solidFill>
+            <a:schemeClr val="tx1"/>
+          </a:solidFill>
+          <a:ln>
+            <a:noFill/>
+          </a:ln>
+        </p:spPr>
+        <p:style>
+          <a:lnRef idx="2">
+            <a:schemeClr val="accent1">
+              <a:shade val="50000"/>
+            </a:schemeClr>
+          </a:lnRef>
+          <a:fillRef idx="1">
+            <a:schemeClr val="accent1"/>
+          </a:fillRef>
+          <a:effectRef idx="0">
+            <a:schemeClr val="accent1"/>
+          </a:effectRef>
+          <a:fontRef idx="minor">
+            <a:schemeClr val="lt1"/>
+          </a:fontRef>
+        </p:style>
+        <p:txBody>
+          <a:bodyPr rtlCol="0" anchor="ctr"/>
+          <a:lstStyle/>
+          <a:p>
+            <a:pPr algn="ctr"/>
+            <a:endParaRPr lang="en-US"/>
+          </a:p>
+        </p:txBody>
+      </p:sp>
+      <p:sp>
+        <p:nvSpPr>
+          <p:cNvPr id="2" name="Tytuł 1">
+            <a:extLst>
+              <a:ext uri="{FF2B5EF4-FFF2-40B4-BE49-F238E27FC236}">
+                <a16:creationId xmlns:a16="http://schemas.microsoft.com/office/drawing/2014/main" id="{627294C7-86C7-C049-ADEC-D72D76DFA9CC}"/>
+              </a:ext>
+            </a:extLst>
+          </p:cNvPr>
+          <p:cNvSpPr>
+            <a:spLocks noGrp="1"/>
+          </p:cNvSpPr>
+          <p:nvPr>
+            <p:ph type="title"/>
+          </p:nvPr>
+        </p:nvSpPr>
+        <p:spPr>
+          <a:xfrm>
+            <a:off x="593634" y="915153"/>
+            <a:ext cx="11958320" cy="1059322"/>
+          </a:xfrm>
+        </p:spPr>
+        <p:txBody>
+          <a:bodyPr vert="horz" lIns="91440" tIns="45720" rIns="91440" bIns="45720" rtlCol="0" anchor="ctr">
+            <a:normAutofit/>
+          </a:bodyPr>
+          <a:lstStyle/>
+          <a:p>
+            <a:pPr algn="ctr" defTabSz="914400"/>
+            <a:r>
+              <a:rPr lang="en-US" sz="4000" kern="1200">
+                <a:solidFill>
+                  <a:schemeClr val="bg1"/>
+                </a:solidFill>
+                <a:latin typeface="+mj-lt"/>
+                <a:ea typeface="+mj-ea"/>
+                <a:cs typeface="+mj-cs"/>
+              </a:rPr>
+              <a:t>Przykład</a:t>
+            </a:r>
+          </a:p>
+        </p:txBody>
+      </p:sp>
+      <p:pic>
+        <p:nvPicPr>
+          <p:cNvPr id="5" name="Symbol zastępczy zawartości 4">
+            <a:extLst>
+              <a:ext uri="{FF2B5EF4-FFF2-40B4-BE49-F238E27FC236}">
+                <a16:creationId xmlns:a16="http://schemas.microsoft.com/office/drawing/2014/main" id="{D9730331-7171-FE4A-9ECD-8F525DC09FC8}"/>
+              </a:ext>
+            </a:extLst>
+          </p:cNvPr>
+          <p:cNvPicPr>
+            <a:picLocks noGrp="1" noChangeAspect="1"/>
+          </p:cNvPicPr>
+          <p:nvPr>
+            <p:ph idx="1"/>
+          </p:nvPr>
+        </p:nvPicPr>
+        <p:blipFill>
+          <a:blip r:embed="rId2">
+            <a:extLst>
+              <a:ext uri="{28A0092B-C50C-407E-A947-70E740481C1C}">
+                <a14:useLocalDpi xmlns:a14="http://schemas.microsoft.com/office/drawing/2010/main" val="0"/>
+              </a:ext>
+            </a:extLst>
+          </a:blip>
+          <a:stretch>
+            <a:fillRect/>
+          </a:stretch>
+        </p:blipFill>
+        <p:spPr>
+          <a:xfrm>
+            <a:off x="1990105" y="2382545"/>
+            <a:ext cx="9024588" cy="6249527"/>
+          </a:xfrm>
+          <a:prstGeom prst="rect">
+            <a:avLst/>
+          </a:prstGeom>
+        </p:spPr>
+      </p:pic>
+    </p:spTree>
+    <p:extLst>
+      <p:ext uri="{BB962C8B-B14F-4D97-AF65-F5344CB8AC3E}">
+        <p14:creationId xmlns:p14="http://schemas.microsoft.com/office/powerpoint/2010/main" val="1918201233"/>
+      </p:ext>
+    </p:extLst>
+  </p:cSld>
+  <p:clrMapOvr>
+    <a:masterClrMapping/>
+  </p:clrMapOvr>
+</p:sld>
+</file>
+
+<file path=ppt/slides/slide8.xml><?xml version="1.0" encoding="utf-8"?>
+<p:sld xmlns:a="http://schemas.openxmlformats.org/drawingml/2006/main" xmlns:r="http://schemas.openxmlformats.org/officeDocument/2006/relationships" xmlns:p="http://schemas.openxmlformats.org/presentationml/2006/main">
+  <p:cSld>
     <p:spTree>
       <p:nvGrpSpPr>
         <p:cNvPr id="1" name=""/>
@@ -7286,6 +7469,15 @@
                 <a:hlinkClick r:id="rId5"/>
               </a:rPr>
               <a:t>https://commons.wikimedia.org/wiki/File:HSL_color_solid_cylinder.png</a:t>
+            </a:r>
+            <a:endParaRPr lang="pl-PL" dirty="0"/>
+          </a:p>
+          <a:p>
+            <a:r>
+              <a:rPr lang="pl-PL" dirty="0">
+                <a:hlinkClick r:id="rId6"/>
+              </a:rPr>
+              <a:t>http://colorizer.org/</a:t>
             </a:r>
             <a:endParaRPr lang="pl-PL" dirty="0"/>
           </a:p>

</xml_diff>